<commit_message>
Change copyright from Inc. to PBC
</commit_message>
<xml_diff>
--- a/mosaic-cheatsheet-lattice.pptx
+++ b/mosaic-cheatsheet-lattice.pptx
@@ -110,7 +110,7 @@
   </p:defaultTextStyle>
   <p:extLst>
     <p:ext uri="{EFAFB233-063F-42B5-8137-9DF3F51BA10A}">
-      <p15:sldGuideLst xmlns:p15="http://schemas.microsoft.com/office/powerpoint/2012/main" xmlns="">
+      <p15:sldGuideLst xmlns:p15="http://schemas.microsoft.com/office/powerpoint/2012/main">
         <p15:guide id="1" orient="horz" pos="3400">
           <p15:clr>
             <a:srgbClr val="A4A3A4"/>
@@ -2742,7 +2742,27 @@
                 <a:latin typeface="Source Sans Pro Light"/>
                 <a:ea typeface="Source Sans Pro Light"/>
               </a:rPr>
-              <a:t>, Inc.  •  </a:t>
+              <a:t>, </a:t>
+            </a:r>
+            <a:r>
+              <a:rPr lang="en-US" sz="900" b="0" strike="noStrike" spc="-1" dirty="0" smtClean="0">
+                <a:solidFill>
+                  <a:srgbClr val="000000"/>
+                </a:solidFill>
+                <a:latin typeface="Source Sans Pro Light"/>
+                <a:ea typeface="Source Sans Pro Light"/>
+              </a:rPr>
+              <a:t>PBC  </a:t>
+            </a:r>
+            <a:r>
+              <a:rPr lang="en-US" sz="900" b="0" strike="noStrike" spc="-1" dirty="0">
+                <a:solidFill>
+                  <a:srgbClr val="000000"/>
+                </a:solidFill>
+                <a:latin typeface="Source Sans Pro Light"/>
+                <a:ea typeface="Source Sans Pro Light"/>
+              </a:rPr>
+              <a:t>•  </a:t>
             </a:r>
             <a:r>
               <a:rPr lang="en-US" sz="900" b="0" u="sng" strike="noStrike" spc="-1" dirty="0">
@@ -3654,7 +3674,7 @@
                             <a:solidFill>
                               <a:srgbClr val="000000"/>
                             </a:solidFill>
-                            <a:latin typeface="Cambria Math"/>
+                            <a:latin typeface="Cambria Math" panose="02040503050406030204" pitchFamily="18" charset="0"/>
                             <a:ea typeface="Menlo"/>
                           </a:rPr>
                         </m:ctrlPr>
@@ -8666,7 +8686,7 @@
           <p:cNvPr id="2" name="Picture 1">
             <a:extLst>
               <a:ext uri="{FF2B5EF4-FFF2-40B4-BE49-F238E27FC236}">
-                <a16:creationId xmlns:a16="http://schemas.microsoft.com/office/drawing/2014/main" xmlns="" id="{3413C69E-B40F-4763-B061-53D1773D16F0}"/>
+                <a16:creationId xmlns:a16="http://schemas.microsoft.com/office/drawing/2014/main" id="{3413C69E-B40F-4763-B061-53D1773D16F0}"/>
               </a:ext>
             </a:extLst>
           </p:cNvPr>
@@ -8696,7 +8716,7 @@
           <p:cNvPr id="8" name="Picture 7">
             <a:extLst>
               <a:ext uri="{FF2B5EF4-FFF2-40B4-BE49-F238E27FC236}">
-                <a16:creationId xmlns:a16="http://schemas.microsoft.com/office/drawing/2014/main" xmlns="" id="{963B9C69-89E5-48D8-9B96-1B4B892EBE5E}"/>
+                <a16:creationId xmlns:a16="http://schemas.microsoft.com/office/drawing/2014/main" id="{963B9C69-89E5-48D8-9B96-1B4B892EBE5E}"/>
               </a:ext>
             </a:extLst>
           </p:cNvPr>
@@ -8726,7 +8746,7 @@
           <p:cNvPr id="9" name="Picture 8">
             <a:extLst>
               <a:ext uri="{FF2B5EF4-FFF2-40B4-BE49-F238E27FC236}">
-                <a16:creationId xmlns:a16="http://schemas.microsoft.com/office/drawing/2014/main" xmlns="" id="{BBF7067E-8FBE-4D5D-AB5E-5C90DBB20DC2}"/>
+                <a16:creationId xmlns:a16="http://schemas.microsoft.com/office/drawing/2014/main" id="{BBF7067E-8FBE-4D5D-AB5E-5C90DBB20DC2}"/>
               </a:ext>
             </a:extLst>
           </p:cNvPr>
@@ -8810,7 +8830,7 @@
           <p:cNvPr id="36" name="CustomShape 27">
             <a:extLst>
               <a:ext uri="{FF2B5EF4-FFF2-40B4-BE49-F238E27FC236}">
-                <a16:creationId xmlns:a16="http://schemas.microsoft.com/office/drawing/2014/main" xmlns="" id="{45A3C8FF-D918-492C-A736-CBE7DFCE1A1D}"/>
+                <a16:creationId xmlns:a16="http://schemas.microsoft.com/office/drawing/2014/main" id="{45A3C8FF-D918-492C-A736-CBE7DFCE1A1D}"/>
               </a:ext>
             </a:extLst>
           </p:cNvPr>
@@ -8876,7 +8896,7 @@
           <p:cNvPr id="37" name="CustomShape 28">
             <a:extLst>
               <a:ext uri="{FF2B5EF4-FFF2-40B4-BE49-F238E27FC236}">
-                <a16:creationId xmlns:a16="http://schemas.microsoft.com/office/drawing/2014/main" xmlns="" id="{FE1CB5B8-5F36-4E1B-A410-65B16B981E7E}"/>
+                <a16:creationId xmlns:a16="http://schemas.microsoft.com/office/drawing/2014/main" id="{FE1CB5B8-5F36-4E1B-A410-65B16B981E7E}"/>
               </a:ext>
             </a:extLst>
           </p:cNvPr>
@@ -9268,7 +9288,7 @@
           <p:cNvPr id="38" name="CustomShape 16">
             <a:extLst>
               <a:ext uri="{FF2B5EF4-FFF2-40B4-BE49-F238E27FC236}">
-                <a16:creationId xmlns:a16="http://schemas.microsoft.com/office/drawing/2014/main" xmlns="" id="{FE686C5A-A207-4B9B-B93E-3F46E9E11573}"/>
+                <a16:creationId xmlns:a16="http://schemas.microsoft.com/office/drawing/2014/main" id="{FE686C5A-A207-4B9B-B93E-3F46E9E11573}"/>
               </a:ext>
             </a:extLst>
           </p:cNvPr>
@@ -9334,7 +9354,7 @@
           <p:cNvPr id="39" name="CustomShape 20">
             <a:extLst>
               <a:ext uri="{FF2B5EF4-FFF2-40B4-BE49-F238E27FC236}">
-                <a16:creationId xmlns:a16="http://schemas.microsoft.com/office/drawing/2014/main" xmlns="" id="{BBEC1559-FF7E-40CC-918C-D3026D98F6E8}"/>
+                <a16:creationId xmlns:a16="http://schemas.microsoft.com/office/drawing/2014/main" id="{BBEC1559-FF7E-40CC-918C-D3026D98F6E8}"/>
               </a:ext>
             </a:extLst>
           </p:cNvPr>
@@ -13303,7 +13323,7 @@
           <p:cNvPr id="3" name="Picture 2">
             <a:extLst>
               <a:ext uri="{FF2B5EF4-FFF2-40B4-BE49-F238E27FC236}">
-                <a16:creationId xmlns:a16="http://schemas.microsoft.com/office/drawing/2014/main" xmlns="" id="{12A146D7-94BF-400A-A6F0-B63E1B3D053E}"/>
+                <a16:creationId xmlns:a16="http://schemas.microsoft.com/office/drawing/2014/main" id="{12A146D7-94BF-400A-A6F0-B63E1B3D053E}"/>
               </a:ext>
             </a:extLst>
           </p:cNvPr>
@@ -13333,7 +13353,7 @@
           <p:cNvPr id="4" name="Picture 3">
             <a:extLst>
               <a:ext uri="{FF2B5EF4-FFF2-40B4-BE49-F238E27FC236}">
-                <a16:creationId xmlns:a16="http://schemas.microsoft.com/office/drawing/2014/main" xmlns="" id="{F2F6CF5C-A728-4A9C-A63A-90BAE00AC094}"/>
+                <a16:creationId xmlns:a16="http://schemas.microsoft.com/office/drawing/2014/main" id="{F2F6CF5C-A728-4A9C-A63A-90BAE00AC094}"/>
               </a:ext>
             </a:extLst>
           </p:cNvPr>
@@ -13363,7 +13383,7 @@
           <p:cNvPr id="5" name="Picture 4">
             <a:extLst>
               <a:ext uri="{FF2B5EF4-FFF2-40B4-BE49-F238E27FC236}">
-                <a16:creationId xmlns:a16="http://schemas.microsoft.com/office/drawing/2014/main" xmlns="" id="{D2D461C5-EE8C-400C-B03E-648CF0942D52}"/>
+                <a16:creationId xmlns:a16="http://schemas.microsoft.com/office/drawing/2014/main" id="{D2D461C5-EE8C-400C-B03E-648CF0942D52}"/>
               </a:ext>
             </a:extLst>
           </p:cNvPr>
@@ -13393,7 +13413,7 @@
           <p:cNvPr id="29" name="CustomShape 4">
             <a:extLst>
               <a:ext uri="{FF2B5EF4-FFF2-40B4-BE49-F238E27FC236}">
-                <a16:creationId xmlns:a16="http://schemas.microsoft.com/office/drawing/2014/main" xmlns="" id="{FA44E67C-3FF1-4558-AB14-26AE8A22A162}"/>
+                <a16:creationId xmlns:a16="http://schemas.microsoft.com/office/drawing/2014/main" id="{FA44E67C-3FF1-4558-AB14-26AE8A22A162}"/>
               </a:ext>
             </a:extLst>
           </p:cNvPr>
@@ -13472,7 +13492,27 @@
                 <a:latin typeface="Source Sans Pro Light"/>
                 <a:ea typeface="Source Sans Pro Light"/>
               </a:rPr>
-              <a:t>, Inc.  •  </a:t>
+              <a:t>, </a:t>
+            </a:r>
+            <a:r>
+              <a:rPr lang="en-US" sz="900" b="0" strike="noStrike" spc="-1" dirty="0" smtClean="0">
+                <a:solidFill>
+                  <a:srgbClr val="000000"/>
+                </a:solidFill>
+                <a:latin typeface="Source Sans Pro Light"/>
+                <a:ea typeface="Source Sans Pro Light"/>
+              </a:rPr>
+              <a:t>PBC  </a:t>
+            </a:r>
+            <a:r>
+              <a:rPr lang="en-US" sz="900" b="0" strike="noStrike" spc="-1" dirty="0">
+                <a:solidFill>
+                  <a:srgbClr val="000000"/>
+                </a:solidFill>
+                <a:latin typeface="Source Sans Pro Light"/>
+                <a:ea typeface="Source Sans Pro Light"/>
+              </a:rPr>
+              <a:t>•  </a:t>
             </a:r>
             <a:r>
               <a:rPr lang="en-US" sz="900" b="0" u="sng" strike="noStrike" spc="-1" dirty="0">
@@ -13526,7 +13566,7 @@
           <p:cNvPr id="30" name="CustomShape 5">
             <a:extLst>
               <a:ext uri="{FF2B5EF4-FFF2-40B4-BE49-F238E27FC236}">
-                <a16:creationId xmlns:a16="http://schemas.microsoft.com/office/drawing/2014/main" xmlns="" id="{C98A7EA2-6B6B-4EBA-BFFD-9DB57EF48BEA}"/>
+                <a16:creationId xmlns:a16="http://schemas.microsoft.com/office/drawing/2014/main" id="{C98A7EA2-6B6B-4EBA-BFFD-9DB57EF48BEA}"/>
               </a:ext>
             </a:extLst>
           </p:cNvPr>
@@ -13628,7 +13668,7 @@
           <p:cNvPr id="33" name="CustomShape 12">
             <a:extLst>
               <a:ext uri="{FF2B5EF4-FFF2-40B4-BE49-F238E27FC236}">
-                <a16:creationId xmlns:a16="http://schemas.microsoft.com/office/drawing/2014/main" xmlns="" id="{9BF7BC54-7CA9-453F-8F94-E1B7DAC01C1D}"/>
+                <a16:creationId xmlns:a16="http://schemas.microsoft.com/office/drawing/2014/main" id="{9BF7BC54-7CA9-453F-8F94-E1B7DAC01C1D}"/>
               </a:ext>
             </a:extLst>
           </p:cNvPr>
@@ -13694,7 +13734,7 @@
           <p:cNvPr id="34" name="CustomShape 13">
             <a:extLst>
               <a:ext uri="{FF2B5EF4-FFF2-40B4-BE49-F238E27FC236}">
-                <a16:creationId xmlns:a16="http://schemas.microsoft.com/office/drawing/2014/main" xmlns="" id="{FDC5BC65-617F-49E1-8C35-871FF07F47D3}"/>
+                <a16:creationId xmlns:a16="http://schemas.microsoft.com/office/drawing/2014/main" id="{FDC5BC65-617F-49E1-8C35-871FF07F47D3}"/>
               </a:ext>
             </a:extLst>
           </p:cNvPr>
@@ -14217,7 +14257,7 @@
           <p:cNvPr id="35" name="CustomShape 14">
             <a:extLst>
               <a:ext uri="{FF2B5EF4-FFF2-40B4-BE49-F238E27FC236}">
-                <a16:creationId xmlns:a16="http://schemas.microsoft.com/office/drawing/2014/main" xmlns="" id="{9F30AC8D-69F9-4E24-8DBD-2817B548CE53}"/>
+                <a16:creationId xmlns:a16="http://schemas.microsoft.com/office/drawing/2014/main" id="{9F30AC8D-69F9-4E24-8DBD-2817B548CE53}"/>
               </a:ext>
             </a:extLst>
           </p:cNvPr>
@@ -14303,7 +14343,7 @@
           <p:cNvPr id="36" name="CustomShape 18">
             <a:extLst>
               <a:ext uri="{FF2B5EF4-FFF2-40B4-BE49-F238E27FC236}">
-                <a16:creationId xmlns:a16="http://schemas.microsoft.com/office/drawing/2014/main" xmlns="" id="{8175304C-6720-458D-A4B4-BC18A65DECB7}"/>
+                <a16:creationId xmlns:a16="http://schemas.microsoft.com/office/drawing/2014/main" id="{8175304C-6720-458D-A4B4-BC18A65DECB7}"/>
               </a:ext>
             </a:extLst>
           </p:cNvPr>
@@ -14369,7 +14409,7 @@
           <p:cNvPr id="37" name="CustomShape 11">
             <a:extLst>
               <a:ext uri="{FF2B5EF4-FFF2-40B4-BE49-F238E27FC236}">
-                <a16:creationId xmlns:a16="http://schemas.microsoft.com/office/drawing/2014/main" xmlns="" id="{66EDF1E5-D5F8-4B3F-BF43-45520FB3047D}"/>
+                <a16:creationId xmlns:a16="http://schemas.microsoft.com/office/drawing/2014/main" id="{66EDF1E5-D5F8-4B3F-BF43-45520FB3047D}"/>
               </a:ext>
             </a:extLst>
           </p:cNvPr>
@@ -14543,7 +14583,7 @@
           <p:cNvPr id="31" name="CustomShape 20">
             <a:extLst>
               <a:ext uri="{FF2B5EF4-FFF2-40B4-BE49-F238E27FC236}">
-                <a16:creationId xmlns:a16="http://schemas.microsoft.com/office/drawing/2014/main" xmlns="" id="{8C51053E-1BD8-4D69-807B-85FFAA91D01F}"/>
+                <a16:creationId xmlns:a16="http://schemas.microsoft.com/office/drawing/2014/main" id="{8C51053E-1BD8-4D69-807B-85FFAA91D01F}"/>
               </a:ext>
             </a:extLst>
           </p:cNvPr>
@@ -14959,7 +14999,7 @@
           <p:cNvPr id="38" name="CustomShape 11">
             <a:extLst>
               <a:ext uri="{FF2B5EF4-FFF2-40B4-BE49-F238E27FC236}">
-                <a16:creationId xmlns:a16="http://schemas.microsoft.com/office/drawing/2014/main" xmlns="" id="{80FB9226-5CF8-4E43-A14B-2177829A4633}"/>
+                <a16:creationId xmlns:a16="http://schemas.microsoft.com/office/drawing/2014/main" id="{80FB9226-5CF8-4E43-A14B-2177829A4633}"/>
               </a:ext>
             </a:extLst>
           </p:cNvPr>
@@ -15444,7 +15484,7 @@
           <p:cNvPr id="39" name="CustomShape 7">
             <a:extLst>
               <a:ext uri="{FF2B5EF4-FFF2-40B4-BE49-F238E27FC236}">
-                <a16:creationId xmlns:a16="http://schemas.microsoft.com/office/drawing/2014/main" xmlns="" id="{9ED32AB9-3A08-4952-8EE2-D174E0DD0A23}"/>
+                <a16:creationId xmlns:a16="http://schemas.microsoft.com/office/drawing/2014/main" id="{9ED32AB9-3A08-4952-8EE2-D174E0DD0A23}"/>
               </a:ext>
             </a:extLst>
           </p:cNvPr>
@@ -16004,7 +16044,7 @@
           <p:cNvPr id="40" name="Picture 7">
             <a:extLst>
               <a:ext uri="{FF2B5EF4-FFF2-40B4-BE49-F238E27FC236}">
-                <a16:creationId xmlns:a16="http://schemas.microsoft.com/office/drawing/2014/main" xmlns="" id="{40563545-D9EB-49CF-916A-6133BCF6EB44}"/>
+                <a16:creationId xmlns:a16="http://schemas.microsoft.com/office/drawing/2014/main" id="{40563545-D9EB-49CF-916A-6133BCF6EB44}"/>
               </a:ext>
             </a:extLst>
           </p:cNvPr>

</xml_diff>